<commit_message>
Deployed 3c63b87 with MkDocs version: 1.4.2
</commit_message>
<xml_diff>
--- a/aulas/14-primitivas_geometricas/aula14_primitivas_geometricas.pptx
+++ b/aulas/14-primitivas_geometricas/aula14_primitivas_geometricas.pptx
@@ -9,11 +9,11 @@
   </p:notesMasterIdLst>
   <p:sldIdLst>
     <p:sldId id="256" r:id="rId2"/>
-    <p:sldId id="337" r:id="rId3"/>
-    <p:sldId id="317" r:id="rId4"/>
-    <p:sldId id="318" r:id="rId5"/>
-    <p:sldId id="338" r:id="rId6"/>
-    <p:sldId id="312" r:id="rId7"/>
+    <p:sldId id="317" r:id="rId3"/>
+    <p:sldId id="318" r:id="rId4"/>
+    <p:sldId id="338" r:id="rId5"/>
+    <p:sldId id="312" r:id="rId6"/>
+    <p:sldId id="340" r:id="rId7"/>
     <p:sldId id="313" r:id="rId8"/>
     <p:sldId id="339" r:id="rId9"/>
     <p:sldId id="319" r:id="rId10"/>
@@ -1699,122 +1699,6 @@
   <p:cSld>
     <p:spTree>
       <p:nvGrpSpPr>
-        <p:cNvPr id="1" name="Shape 48"/>
-        <p:cNvGrpSpPr/>
-        <p:nvPr/>
-      </p:nvGrpSpPr>
-      <p:grpSpPr>
-        <a:xfrm>
-          <a:off x="0" y="0"/>
-          <a:ext cx="0" cy="0"/>
-          <a:chOff x="0" y="0"/>
-          <a:chExt cx="0" cy="0"/>
-        </a:xfrm>
-      </p:grpSpPr>
-      <p:sp>
-        <p:nvSpPr>
-          <p:cNvPr id="49" name="Google Shape;49;gecf7fce6d5_0_0:notes"/>
-          <p:cNvSpPr>
-            <a:spLocks noGrp="1" noRot="1" noChangeAspect="1"/>
-          </p:cNvSpPr>
-          <p:nvPr>
-            <p:ph type="sldImg" idx="2"/>
-          </p:nvPr>
-        </p:nvSpPr>
-        <p:spPr>
-          <a:xfrm>
-            <a:off x="686100" y="685800"/>
-            <a:ext cx="5486400" cy="3429000"/>
-          </a:xfrm>
-          <a:custGeom>
-            <a:avLst/>
-            <a:gdLst/>
-            <a:ahLst/>
-            <a:cxnLst/>
-            <a:rect l="l" t="t" r="r" b="b"/>
-            <a:pathLst>
-              <a:path w="120000" h="120000" extrusionOk="0">
-                <a:moveTo>
-                  <a:pt x="0" y="0"/>
-                </a:moveTo>
-                <a:lnTo>
-                  <a:pt x="120000" y="0"/>
-                </a:lnTo>
-                <a:lnTo>
-                  <a:pt x="120000" y="120000"/>
-                </a:lnTo>
-                <a:lnTo>
-                  <a:pt x="0" y="120000"/>
-                </a:lnTo>
-                <a:close/>
-              </a:path>
-            </a:pathLst>
-          </a:custGeom>
-        </p:spPr>
-      </p:sp>
-      <p:sp>
-        <p:nvSpPr>
-          <p:cNvPr id="50" name="Google Shape;50;gecf7fce6d5_0_0:notes"/>
-          <p:cNvSpPr txBox="1">
-            <a:spLocks noGrp="1"/>
-          </p:cNvSpPr>
-          <p:nvPr>
-            <p:ph type="body" idx="1"/>
-          </p:nvPr>
-        </p:nvSpPr>
-        <p:spPr>
-          <a:xfrm>
-            <a:off x="685800" y="4343400"/>
-            <a:ext cx="5486400" cy="4114800"/>
-          </a:xfrm>
-          <a:prstGeom prst="rect">
-            <a:avLst/>
-          </a:prstGeom>
-        </p:spPr>
-        <p:txBody>
-          <a:bodyPr spcFirstLastPara="1" wrap="square" lIns="91425" tIns="45700" rIns="91425" bIns="45700" anchor="t" anchorCtr="0">
-            <a:noAutofit/>
-          </a:bodyPr>
-          <a:lstStyle/>
-          <a:p>
-            <a:pPr marL="0" lvl="0" indent="0" algn="l" rtl="0">
-              <a:spcBef>
-                <a:spcPts val="0"/>
-              </a:spcBef>
-              <a:spcAft>
-                <a:spcPts val="0"/>
-              </a:spcAft>
-              <a:buNone/>
-            </a:pPr>
-            <a:endParaRPr dirty="0"/>
-          </a:p>
-          <a:p>
-            <a:pPr marL="0" lvl="0" indent="0" algn="l" rtl="0">
-              <a:spcBef>
-                <a:spcPts val="0"/>
-              </a:spcBef>
-              <a:spcAft>
-                <a:spcPts val="0"/>
-              </a:spcAft>
-              <a:buNone/>
-            </a:pPr>
-            <a:endParaRPr dirty="0"/>
-          </a:p>
-        </p:txBody>
-      </p:sp>
-    </p:spTree>
-  </p:cSld>
-  <p:clrMapOvr>
-    <a:masterClrMapping/>
-  </p:clrMapOvr>
-</p:notes>
-</file>
-
-<file path=ppt/notesSlides/notesSlide3.xml><?xml version="1.0" encoding="utf-8"?>
-<p:notes xmlns:a="http://schemas.openxmlformats.org/drawingml/2006/main" xmlns:r="http://schemas.openxmlformats.org/officeDocument/2006/relationships" xmlns:p="http://schemas.openxmlformats.org/presentationml/2006/main" showMasterSp="0" showMasterPhAnim="0">
-  <p:cSld>
-    <p:spTree>
-      <p:nvGrpSpPr>
         <p:cNvPr id="1" name="Shape 454"/>
         <p:cNvGrpSpPr/>
         <p:nvPr/>
@@ -1914,7 +1798,7 @@
 </p:notes>
 </file>
 
-<file path=ppt/notesSlides/notesSlide4.xml><?xml version="1.0" encoding="utf-8"?>
+<file path=ppt/notesSlides/notesSlide3.xml><?xml version="1.0" encoding="utf-8"?>
 <p:notes xmlns:a="http://schemas.openxmlformats.org/drawingml/2006/main" xmlns:r="http://schemas.openxmlformats.org/officeDocument/2006/relationships" xmlns:p="http://schemas.openxmlformats.org/presentationml/2006/main" showMasterSp="0" showMasterPhAnim="0">
   <p:cSld>
     <p:spTree>
@@ -2018,7 +1902,7 @@
 </p:notes>
 </file>
 
-<file path=ppt/notesSlides/notesSlide5.xml><?xml version="1.0" encoding="utf-8"?>
+<file path=ppt/notesSlides/notesSlide4.xml><?xml version="1.0" encoding="utf-8"?>
 <p:notes xmlns:a="http://schemas.openxmlformats.org/drawingml/2006/main" xmlns:r="http://schemas.openxmlformats.org/officeDocument/2006/relationships" xmlns:p="http://schemas.openxmlformats.org/presentationml/2006/main" showMasterSp="0" showMasterPhAnim="0">
   <p:cSld>
     <p:spTree>
@@ -2113,6 +1997,156 @@
             </a:pathLst>
           </a:custGeom>
         </p:spPr>
+      </p:sp>
+    </p:spTree>
+  </p:cSld>
+  <p:clrMapOvr>
+    <a:masterClrMapping/>
+  </p:clrMapOvr>
+</p:notes>
+</file>
+
+<file path=ppt/notesSlides/notesSlide5.xml><?xml version="1.0" encoding="utf-8"?>
+<p:notes xmlns:a="http://schemas.openxmlformats.org/drawingml/2006/main" xmlns:r="http://schemas.openxmlformats.org/officeDocument/2006/relationships" xmlns:p="http://schemas.openxmlformats.org/presentationml/2006/main" showMasterSp="0" showMasterPhAnim="0">
+  <p:cSld>
+    <p:spTree>
+      <p:nvGrpSpPr>
+        <p:cNvPr id="1" name="Shape 722"/>
+        <p:cNvGrpSpPr/>
+        <p:nvPr/>
+      </p:nvGrpSpPr>
+      <p:grpSpPr>
+        <a:xfrm>
+          <a:off x="0" y="0"/>
+          <a:ext cx="0" cy="0"/>
+          <a:chOff x="0" y="0"/>
+          <a:chExt cx="0" cy="0"/>
+        </a:xfrm>
+      </p:grpSpPr>
+      <p:sp>
+        <p:nvSpPr>
+          <p:cNvPr id="723" name="Google Shape;723;gee0e4c76e4_0_4:notes"/>
+          <p:cNvSpPr>
+            <a:spLocks noGrp="1" noRot="1" noChangeAspect="1"/>
+          </p:cNvSpPr>
+          <p:nvPr>
+            <p:ph type="sldImg" idx="2"/>
+          </p:nvPr>
+        </p:nvSpPr>
+        <p:spPr>
+          <a:xfrm>
+            <a:off x="685800" y="685800"/>
+            <a:ext cx="5486400" cy="3429000"/>
+          </a:xfrm>
+          <a:custGeom>
+            <a:avLst/>
+            <a:gdLst/>
+            <a:ahLst/>
+            <a:cxnLst/>
+            <a:rect l="l" t="t" r="r" b="b"/>
+            <a:pathLst>
+              <a:path w="120000" h="120000" extrusionOk="0">
+                <a:moveTo>
+                  <a:pt x="0" y="0"/>
+                </a:moveTo>
+                <a:lnTo>
+                  <a:pt x="120000" y="0"/>
+                </a:lnTo>
+                <a:lnTo>
+                  <a:pt x="120000" y="120000"/>
+                </a:lnTo>
+                <a:lnTo>
+                  <a:pt x="0" y="120000"/>
+                </a:lnTo>
+                <a:close/>
+              </a:path>
+            </a:pathLst>
+          </a:custGeom>
+        </p:spPr>
+      </p:sp>
+      <p:sp>
+        <p:nvSpPr>
+          <p:cNvPr id="724" name="Google Shape;724;gee0e4c76e4_0_4:notes"/>
+          <p:cNvSpPr txBox="1">
+            <a:spLocks noGrp="1"/>
+          </p:cNvSpPr>
+          <p:nvPr>
+            <p:ph type="body" idx="1"/>
+          </p:nvPr>
+        </p:nvSpPr>
+        <p:spPr>
+          <a:xfrm>
+            <a:off x="685800" y="4343400"/>
+            <a:ext cx="5486400" cy="4114800"/>
+          </a:xfrm>
+          <a:prstGeom prst="rect">
+            <a:avLst/>
+          </a:prstGeom>
+        </p:spPr>
+        <p:txBody>
+          <a:bodyPr spcFirstLastPara="1" wrap="square" lIns="91425" tIns="45700" rIns="91425" bIns="45700" anchor="t" anchorCtr="0">
+            <a:noAutofit/>
+          </a:bodyPr>
+          <a:lstStyle/>
+          <a:p>
+            <a:pPr marL="0" lvl="0" indent="0" algn="l" rtl="0">
+              <a:spcBef>
+                <a:spcPts val="0"/>
+              </a:spcBef>
+              <a:spcAft>
+                <a:spcPts val="0"/>
+              </a:spcAft>
+              <a:buNone/>
+            </a:pPr>
+            <a:endParaRPr/>
+          </a:p>
+        </p:txBody>
+      </p:sp>
+      <p:sp>
+        <p:nvSpPr>
+          <p:cNvPr id="725" name="Google Shape;725;gee0e4c76e4_0_4:notes"/>
+          <p:cNvSpPr txBox="1">
+            <a:spLocks noGrp="1"/>
+          </p:cNvSpPr>
+          <p:nvPr>
+            <p:ph type="sldNum" idx="12"/>
+          </p:nvPr>
+        </p:nvSpPr>
+        <p:spPr>
+          <a:xfrm>
+            <a:off x="3884613" y="8685213"/>
+            <a:ext cx="2971800" cy="457200"/>
+          </a:xfrm>
+          <a:prstGeom prst="rect">
+            <a:avLst/>
+          </a:prstGeom>
+        </p:spPr>
+        <p:txBody>
+          <a:bodyPr spcFirstLastPara="1" wrap="square" lIns="91425" tIns="45700" rIns="91425" bIns="45700" anchor="b" anchorCtr="0">
+            <a:noAutofit/>
+          </a:bodyPr>
+          <a:lstStyle/>
+          <a:p>
+            <a:pPr marL="0" lvl="0" indent="0" algn="r" rtl="0">
+              <a:spcBef>
+                <a:spcPts val="0"/>
+              </a:spcBef>
+              <a:spcAft>
+                <a:spcPts val="0"/>
+              </a:spcAft>
+              <a:buClr>
+                <a:srgbClr val="000000"/>
+              </a:buClr>
+              <a:buFont typeface="Arial"/>
+              <a:buNone/>
+            </a:pPr>
+            <a:fld id="{00000000-1234-1234-1234-123412341234}" type="slidenum">
+              <a:rPr lang="pt-BR"/>
+              <a:t>5</a:t>
+            </a:fld>
+            <a:endParaRPr/>
+          </a:p>
+        </p:txBody>
       </p:sp>
     </p:spTree>
   </p:cSld>
@@ -2265,6 +2299,11 @@
         </p:txBody>
       </p:sp>
     </p:spTree>
+    <p:extLst>
+      <p:ext uri="{BB962C8B-B14F-4D97-AF65-F5344CB8AC3E}">
+        <p14:creationId xmlns:p14="http://schemas.microsoft.com/office/powerpoint/2010/main" val="3717335866"/>
+      </p:ext>
+    </p:extLst>
   </p:cSld>
   <p:clrMapOvr>
     <a:masterClrMapping/>
@@ -5607,385 +5646,6 @@
 </p:sldLayout>
 </file>
 
-<file path=ppt/slideLayouts/slideLayout4.xml><?xml version="1.0" encoding="utf-8"?>
-<p:sldLayout xmlns:a="http://schemas.openxmlformats.org/drawingml/2006/main" xmlns:r="http://schemas.openxmlformats.org/officeDocument/2006/relationships" xmlns:p="http://schemas.openxmlformats.org/presentationml/2006/main" matchingName="Title and body" type="tx">
-  <p:cSld name="Title and body">
-    <p:spTree>
-      <p:nvGrpSpPr>
-        <p:cNvPr id="1" name="Shape 23"/>
-        <p:cNvGrpSpPr/>
-        <p:nvPr/>
-      </p:nvGrpSpPr>
-      <p:grpSpPr>
-        <a:xfrm>
-          <a:off x="0" y="0"/>
-          <a:ext cx="0" cy="0"/>
-          <a:chOff x="0" y="0"/>
-          <a:chExt cx="0" cy="0"/>
-        </a:xfrm>
-      </p:grpSpPr>
-      <p:sp>
-        <p:nvSpPr>
-          <p:cNvPr id="24" name="Google Shape;24;p4"/>
-          <p:cNvSpPr txBox="1">
-            <a:spLocks noGrp="1"/>
-          </p:cNvSpPr>
-          <p:nvPr>
-            <p:ph type="title"/>
-          </p:nvPr>
-        </p:nvSpPr>
-        <p:spPr>
-          <a:xfrm>
-            <a:off x="311700" y="494472"/>
-            <a:ext cx="8520600" cy="636300"/>
-          </a:xfrm>
-          <a:prstGeom prst="rect">
-            <a:avLst/>
-          </a:prstGeom>
-          <a:noFill/>
-          <a:ln>
-            <a:noFill/>
-          </a:ln>
-        </p:spPr>
-        <p:txBody>
-          <a:bodyPr spcFirstLastPara="1" wrap="square" lIns="91425" tIns="91425" rIns="91425" bIns="91425" anchor="ctr" anchorCtr="0">
-            <a:noAutofit/>
-          </a:bodyPr>
-          <a:lstStyle>
-            <a:lvl1pPr lvl="0" rtl="0">
-              <a:spcBef>
-                <a:spcPts val="0"/>
-              </a:spcBef>
-              <a:spcAft>
-                <a:spcPts val="0"/>
-              </a:spcAft>
-              <a:buSzPts val="1400"/>
-              <a:buChar char="●"/>
-              <a:defRPr/>
-            </a:lvl1pPr>
-            <a:lvl2pPr lvl="1" rtl="0">
-              <a:spcBef>
-                <a:spcPts val="0"/>
-              </a:spcBef>
-              <a:spcAft>
-                <a:spcPts val="0"/>
-              </a:spcAft>
-              <a:buSzPts val="1400"/>
-              <a:buChar char="○"/>
-              <a:defRPr/>
-            </a:lvl2pPr>
-            <a:lvl3pPr lvl="2" rtl="0">
-              <a:spcBef>
-                <a:spcPts val="0"/>
-              </a:spcBef>
-              <a:spcAft>
-                <a:spcPts val="0"/>
-              </a:spcAft>
-              <a:buSzPts val="1400"/>
-              <a:buChar char="■"/>
-              <a:defRPr/>
-            </a:lvl3pPr>
-            <a:lvl4pPr lvl="3" rtl="0">
-              <a:spcBef>
-                <a:spcPts val="0"/>
-              </a:spcBef>
-              <a:spcAft>
-                <a:spcPts val="0"/>
-              </a:spcAft>
-              <a:buSzPts val="1400"/>
-              <a:buChar char="●"/>
-              <a:defRPr/>
-            </a:lvl4pPr>
-            <a:lvl5pPr lvl="4" rtl="0">
-              <a:spcBef>
-                <a:spcPts val="0"/>
-              </a:spcBef>
-              <a:spcAft>
-                <a:spcPts val="0"/>
-              </a:spcAft>
-              <a:buSzPts val="1400"/>
-              <a:buChar char="○"/>
-              <a:defRPr/>
-            </a:lvl5pPr>
-            <a:lvl6pPr lvl="5" rtl="0">
-              <a:spcBef>
-                <a:spcPts val="0"/>
-              </a:spcBef>
-              <a:spcAft>
-                <a:spcPts val="0"/>
-              </a:spcAft>
-              <a:buSzPts val="1400"/>
-              <a:buChar char="■"/>
-              <a:defRPr/>
-            </a:lvl6pPr>
-            <a:lvl7pPr lvl="6" rtl="0">
-              <a:spcBef>
-                <a:spcPts val="0"/>
-              </a:spcBef>
-              <a:spcAft>
-                <a:spcPts val="0"/>
-              </a:spcAft>
-              <a:buSzPts val="1400"/>
-              <a:buChar char="●"/>
-              <a:defRPr/>
-            </a:lvl7pPr>
-            <a:lvl8pPr lvl="7" rtl="0">
-              <a:spcBef>
-                <a:spcPts val="0"/>
-              </a:spcBef>
-              <a:spcAft>
-                <a:spcPts val="0"/>
-              </a:spcAft>
-              <a:buSzPts val="1400"/>
-              <a:buChar char="○"/>
-              <a:defRPr/>
-            </a:lvl8pPr>
-            <a:lvl9pPr lvl="8" rtl="0">
-              <a:spcBef>
-                <a:spcPts val="0"/>
-              </a:spcBef>
-              <a:spcAft>
-                <a:spcPts val="0"/>
-              </a:spcAft>
-              <a:buSzPts val="1400"/>
-              <a:buChar char="■"/>
-              <a:defRPr/>
-            </a:lvl9pPr>
-          </a:lstStyle>
-          <a:p>
-            <a:endParaRPr/>
-          </a:p>
-        </p:txBody>
-      </p:sp>
-      <p:sp>
-        <p:nvSpPr>
-          <p:cNvPr id="25" name="Google Shape;25;p4"/>
-          <p:cNvSpPr txBox="1">
-            <a:spLocks noGrp="1"/>
-          </p:cNvSpPr>
-          <p:nvPr>
-            <p:ph type="body" idx="1"/>
-          </p:nvPr>
-        </p:nvSpPr>
-        <p:spPr>
-          <a:xfrm>
-            <a:off x="311700" y="1280528"/>
-            <a:ext cx="8520600" cy="3795900"/>
-          </a:xfrm>
-          <a:prstGeom prst="rect">
-            <a:avLst/>
-          </a:prstGeom>
-          <a:noFill/>
-          <a:ln>
-            <a:noFill/>
-          </a:ln>
-        </p:spPr>
-        <p:txBody>
-          <a:bodyPr spcFirstLastPara="1" wrap="square" lIns="91425" tIns="91425" rIns="91425" bIns="91425" anchor="ctr" anchorCtr="0">
-            <a:noAutofit/>
-          </a:bodyPr>
-          <a:lstStyle>
-            <a:lvl1pPr marL="457200" lvl="0" indent="-317500" rtl="0">
-              <a:spcBef>
-                <a:spcPts val="0"/>
-              </a:spcBef>
-              <a:spcAft>
-                <a:spcPts val="0"/>
-              </a:spcAft>
-              <a:buSzPts val="1400"/>
-              <a:buChar char="●"/>
-              <a:defRPr/>
-            </a:lvl1pPr>
-            <a:lvl2pPr marL="914400" lvl="1" indent="-317500" rtl="0">
-              <a:spcBef>
-                <a:spcPts val="0"/>
-              </a:spcBef>
-              <a:spcAft>
-                <a:spcPts val="0"/>
-              </a:spcAft>
-              <a:buSzPts val="1400"/>
-              <a:buChar char="○"/>
-              <a:defRPr/>
-            </a:lvl2pPr>
-            <a:lvl3pPr marL="1371600" lvl="2" indent="-317500" rtl="0">
-              <a:spcBef>
-                <a:spcPts val="0"/>
-              </a:spcBef>
-              <a:spcAft>
-                <a:spcPts val="0"/>
-              </a:spcAft>
-              <a:buSzPts val="1400"/>
-              <a:buChar char="■"/>
-              <a:defRPr/>
-            </a:lvl3pPr>
-            <a:lvl4pPr marL="1828800" lvl="3" indent="-317500" rtl="0">
-              <a:spcBef>
-                <a:spcPts val="0"/>
-              </a:spcBef>
-              <a:spcAft>
-                <a:spcPts val="0"/>
-              </a:spcAft>
-              <a:buSzPts val="1400"/>
-              <a:buChar char="●"/>
-              <a:defRPr/>
-            </a:lvl4pPr>
-            <a:lvl5pPr marL="2286000" lvl="4" indent="-317500" rtl="0">
-              <a:spcBef>
-                <a:spcPts val="0"/>
-              </a:spcBef>
-              <a:spcAft>
-                <a:spcPts val="0"/>
-              </a:spcAft>
-              <a:buSzPts val="1400"/>
-              <a:buChar char="○"/>
-              <a:defRPr/>
-            </a:lvl5pPr>
-            <a:lvl6pPr marL="2743200" lvl="5" indent="-317500" rtl="0">
-              <a:spcBef>
-                <a:spcPts val="0"/>
-              </a:spcBef>
-              <a:spcAft>
-                <a:spcPts val="0"/>
-              </a:spcAft>
-              <a:buSzPts val="1400"/>
-              <a:buChar char="■"/>
-              <a:defRPr/>
-            </a:lvl6pPr>
-            <a:lvl7pPr marL="3200400" lvl="6" indent="-317500" rtl="0">
-              <a:spcBef>
-                <a:spcPts val="0"/>
-              </a:spcBef>
-              <a:spcAft>
-                <a:spcPts val="0"/>
-              </a:spcAft>
-              <a:buSzPts val="1400"/>
-              <a:buChar char="●"/>
-              <a:defRPr/>
-            </a:lvl7pPr>
-            <a:lvl8pPr marL="3657600" lvl="7" indent="-317500" rtl="0">
-              <a:spcBef>
-                <a:spcPts val="0"/>
-              </a:spcBef>
-              <a:spcAft>
-                <a:spcPts val="0"/>
-              </a:spcAft>
-              <a:buSzPts val="1400"/>
-              <a:buChar char="○"/>
-              <a:defRPr/>
-            </a:lvl8pPr>
-            <a:lvl9pPr marL="4114800" lvl="8" indent="-317500" rtl="0">
-              <a:spcBef>
-                <a:spcPts val="0"/>
-              </a:spcBef>
-              <a:spcAft>
-                <a:spcPts val="0"/>
-              </a:spcAft>
-              <a:buSzPts val="1400"/>
-              <a:buChar char="■"/>
-              <a:defRPr/>
-            </a:lvl9pPr>
-          </a:lstStyle>
-          <a:p>
-            <a:endParaRPr/>
-          </a:p>
-        </p:txBody>
-      </p:sp>
-      <p:sp>
-        <p:nvSpPr>
-          <p:cNvPr id="26" name="Google Shape;26;p4"/>
-          <p:cNvSpPr txBox="1">
-            <a:spLocks noGrp="1"/>
-          </p:cNvSpPr>
-          <p:nvPr>
-            <p:ph type="sldNum" idx="12"/>
-          </p:nvPr>
-        </p:nvSpPr>
-        <p:spPr>
-          <a:xfrm>
-            <a:off x="8472458" y="5181352"/>
-            <a:ext cx="548700" cy="437400"/>
-          </a:xfrm>
-          <a:prstGeom prst="rect">
-            <a:avLst/>
-          </a:prstGeom>
-          <a:noFill/>
-          <a:ln>
-            <a:noFill/>
-          </a:ln>
-        </p:spPr>
-        <p:txBody>
-          <a:bodyPr spcFirstLastPara="1" wrap="square" lIns="91425" tIns="91425" rIns="91425" bIns="91425" anchor="ctr" anchorCtr="0">
-            <a:noAutofit/>
-          </a:bodyPr>
-          <a:lstStyle>
-            <a:lvl1pPr lvl="0" rtl="0">
-              <a:buNone/>
-              <a:defRPr/>
-            </a:lvl1pPr>
-            <a:lvl2pPr lvl="1" rtl="0">
-              <a:buNone/>
-              <a:defRPr/>
-            </a:lvl2pPr>
-            <a:lvl3pPr lvl="2" rtl="0">
-              <a:buNone/>
-              <a:defRPr/>
-            </a:lvl3pPr>
-            <a:lvl4pPr lvl="3" rtl="0">
-              <a:buNone/>
-              <a:defRPr/>
-            </a:lvl4pPr>
-            <a:lvl5pPr lvl="4" rtl="0">
-              <a:buNone/>
-              <a:defRPr/>
-            </a:lvl5pPr>
-            <a:lvl6pPr lvl="5" rtl="0">
-              <a:buNone/>
-              <a:defRPr/>
-            </a:lvl6pPr>
-            <a:lvl7pPr lvl="6" rtl="0">
-              <a:buNone/>
-              <a:defRPr/>
-            </a:lvl7pPr>
-            <a:lvl8pPr lvl="7" rtl="0">
-              <a:buNone/>
-              <a:defRPr/>
-            </a:lvl8pPr>
-            <a:lvl9pPr lvl="8" rtl="0">
-              <a:buNone/>
-              <a:defRPr/>
-            </a:lvl9pPr>
-          </a:lstStyle>
-          <a:p>
-            <a:pPr marL="0" lvl="0" indent="0" algn="l" rtl="0">
-              <a:spcBef>
-                <a:spcPts val="0"/>
-              </a:spcBef>
-              <a:spcAft>
-                <a:spcPts val="0"/>
-              </a:spcAft>
-              <a:buNone/>
-            </a:pPr>
-            <a:fld id="{00000000-1234-1234-1234-123412341234}" type="slidenum">
-              <a:rPr lang="pt-BR"/>
-              <a:t>‹#›</a:t>
-            </a:fld>
-            <a:endParaRPr/>
-          </a:p>
-        </p:txBody>
-      </p:sp>
-    </p:spTree>
-    <p:extLst>
-      <p:ext uri="{BB962C8B-B14F-4D97-AF65-F5344CB8AC3E}">
-        <p14:creationId xmlns:p14="http://schemas.microsoft.com/office/powerpoint/2010/main" val="753584336"/>
-      </p:ext>
-    </p:extLst>
-  </p:cSld>
-  <p:clrMapOvr>
-    <a:masterClrMapping/>
-  </p:clrMapOvr>
-</p:sldLayout>
-</file>
-
 <file path=ppt/slideMasters/slideMaster1.xml><?xml version="1.0" encoding="utf-8"?>
 <p:sldMaster xmlns:a="http://schemas.openxmlformats.org/drawingml/2006/main" xmlns:r="http://schemas.openxmlformats.org/officeDocument/2006/relationships" xmlns:p="http://schemas.openxmlformats.org/presentationml/2006/main">
   <p:cSld>
@@ -6018,7 +5678,7 @@
           <p:nvPr/>
         </p:nvPicPr>
         <p:blipFill rotWithShape="1">
-          <a:blip r:embed="rId6">
+          <a:blip r:embed="rId5">
             <a:alphaModFix/>
           </a:blip>
           <a:srcRect/>
@@ -6045,7 +5705,6 @@
     <p:sldLayoutId id="2147483648" r:id="rId1"/>
     <p:sldLayoutId id="2147483649" r:id="rId2"/>
     <p:sldLayoutId id="2147483650" r:id="rId3"/>
-    <p:sldLayoutId id="2147483652" r:id="rId4"/>
   </p:sldLayoutIdLst>
   <p:hf hdr="0" ftr="0" dt="0"/>
   <p:txStyles>
@@ -6852,8 +6511,8 @@
               <a:buNone/>
             </a:pPr>
             <a:r>
-              <a:rPr lang="pt-BR"/>
-              <a:t>Aula 13: Primitivas 3D</a:t>
+              <a:rPr lang="pt-BR" dirty="0"/>
+              <a:t>Aula 14: Primitivas 3D</a:t>
             </a:r>
             <a:endParaRPr dirty="0"/>
           </a:p>
@@ -7541,161 +7200,6 @@
 </file>
 
 <file path=ppt/slides/slide2.xml><?xml version="1.0" encoding="utf-8"?>
-<p:sld xmlns:a="http://schemas.openxmlformats.org/drawingml/2006/main" xmlns:r="http://schemas.openxmlformats.org/officeDocument/2006/relationships" xmlns:p="http://schemas.openxmlformats.org/presentationml/2006/main">
-  <p:cSld>
-    <p:spTree>
-      <p:nvGrpSpPr>
-        <p:cNvPr id="1" name="Shape 51"/>
-        <p:cNvGrpSpPr/>
-        <p:nvPr/>
-      </p:nvGrpSpPr>
-      <p:grpSpPr>
-        <a:xfrm>
-          <a:off x="0" y="0"/>
-          <a:ext cx="0" cy="0"/>
-          <a:chOff x="0" y="0"/>
-          <a:chExt cx="0" cy="0"/>
-        </a:xfrm>
-      </p:grpSpPr>
-      <p:sp>
-        <p:nvSpPr>
-          <p:cNvPr id="52" name="Google Shape;52;p9"/>
-          <p:cNvSpPr txBox="1">
-            <a:spLocks noGrp="1"/>
-          </p:cNvSpPr>
-          <p:nvPr>
-            <p:ph type="title"/>
-          </p:nvPr>
-        </p:nvSpPr>
-        <p:spPr>
-          <a:xfrm>
-            <a:off x="311700" y="494472"/>
-            <a:ext cx="8520600" cy="636300"/>
-          </a:xfrm>
-          <a:prstGeom prst="rect">
-            <a:avLst/>
-          </a:prstGeom>
-        </p:spPr>
-        <p:txBody>
-          <a:bodyPr spcFirstLastPara="1" wrap="square" lIns="91425" tIns="91425" rIns="91425" bIns="91425" anchor="ctr" anchorCtr="0">
-            <a:noAutofit/>
-          </a:bodyPr>
-          <a:lstStyle/>
-          <a:p>
-            <a:pPr marL="0" lvl="0" indent="0" algn="l" rtl="0">
-              <a:spcBef>
-                <a:spcPts val="0"/>
-              </a:spcBef>
-              <a:spcAft>
-                <a:spcPts val="0"/>
-              </a:spcAft>
-              <a:buNone/>
-            </a:pPr>
-            <a:r>
-              <a:rPr lang="en-BR"/>
-              <a:t>Kahoot</a:t>
-            </a:r>
-            <a:endParaRPr dirty="0"/>
-          </a:p>
-        </p:txBody>
-      </p:sp>
-      <p:sp>
-        <p:nvSpPr>
-          <p:cNvPr id="53" name="Google Shape;53;p9"/>
-          <p:cNvSpPr txBox="1">
-            <a:spLocks noGrp="1"/>
-          </p:cNvSpPr>
-          <p:nvPr>
-            <p:ph type="body" idx="1"/>
-          </p:nvPr>
-        </p:nvSpPr>
-        <p:spPr>
-          <a:xfrm>
-            <a:off x="311700" y="4440056"/>
-            <a:ext cx="8520600" cy="636300"/>
-          </a:xfrm>
-          <a:prstGeom prst="rect">
-            <a:avLst/>
-          </a:prstGeom>
-        </p:spPr>
-        <p:txBody>
-          <a:bodyPr spcFirstLastPara="1" wrap="square" lIns="91425" tIns="91425" rIns="91425" bIns="91425" anchor="ctr" anchorCtr="0">
-            <a:noAutofit/>
-          </a:bodyPr>
-          <a:lstStyle/>
-          <a:p>
-            <a:pPr marL="0" lvl="0" indent="0" algn="l" rtl="0">
-              <a:spcBef>
-                <a:spcPts val="0"/>
-              </a:spcBef>
-              <a:spcAft>
-                <a:spcPts val="0"/>
-              </a:spcAft>
-              <a:buClr>
-                <a:schemeClr val="dk1"/>
-              </a:buClr>
-              <a:buSzPts val="1100"/>
-              <a:buFont typeface="Arial"/>
-              <a:buNone/>
-            </a:pPr>
-            <a:r>
-              <a:rPr lang="en-BR" sz="1600"/>
-              <a:t>Entrar em Kahoot.it : </a:t>
-            </a:r>
-            <a:r>
-              <a:rPr lang="en-BR" sz="1600" u="sng">
-                <a:solidFill>
-                  <a:schemeClr val="hlink"/>
-                </a:solidFill>
-                <a:hlinkClick r:id="rId3"/>
-              </a:rPr>
-              <a:t>https://kahoot.it/</a:t>
-            </a:r>
-            <a:r>
-              <a:rPr lang="en-BR" sz="1600"/>
-              <a:t> </a:t>
-            </a:r>
-            <a:endParaRPr sz="1600" dirty="0"/>
-          </a:p>
-        </p:txBody>
-      </p:sp>
-      <p:pic>
-        <p:nvPicPr>
-          <p:cNvPr id="54" name="Google Shape;54;p9"/>
-          <p:cNvPicPr preferRelativeResize="0"/>
-          <p:nvPr/>
-        </p:nvPicPr>
-        <p:blipFill>
-          <a:blip r:embed="rId4">
-            <a:alphaModFix/>
-          </a:blip>
-          <a:stretch>
-            <a:fillRect/>
-          </a:stretch>
-        </p:blipFill>
-        <p:spPr>
-          <a:xfrm>
-            <a:off x="650475" y="1300139"/>
-            <a:ext cx="7843056" cy="2673525"/>
-          </a:xfrm>
-          <a:prstGeom prst="rect">
-            <a:avLst/>
-          </a:prstGeom>
-          <a:noFill/>
-          <a:ln>
-            <a:noFill/>
-          </a:ln>
-        </p:spPr>
-      </p:pic>
-    </p:spTree>
-  </p:cSld>
-  <p:clrMapOvr>
-    <a:masterClrMapping/>
-  </p:clrMapOvr>
-</p:sld>
-</file>
-
-<file path=ppt/slides/slide3.xml><?xml version="1.0" encoding="utf-8"?>
 <p:sld xmlns:a="http://schemas.openxmlformats.org/drawingml/2006/main" xmlns:r="http://schemas.openxmlformats.org/officeDocument/2006/relationships" xmlns:p="http://schemas.openxmlformats.org/presentationml/2006/main">
   <p:cSld>
     <p:spTree>
@@ -7843,7 +7347,7 @@
 </p:sld>
 </file>
 
-<file path=ppt/slides/slide4.xml><?xml version="1.0" encoding="utf-8"?>
+<file path=ppt/slides/slide3.xml><?xml version="1.0" encoding="utf-8"?>
 <p:sld xmlns:a="http://schemas.openxmlformats.org/drawingml/2006/main" xmlns:r="http://schemas.openxmlformats.org/officeDocument/2006/relationships" xmlns:p="http://schemas.openxmlformats.org/presentationml/2006/main">
   <p:cSld>
     <p:spTree>
@@ -8030,7 +7534,7 @@
 </p:sld>
 </file>
 
-<file path=ppt/slides/slide5.xml><?xml version="1.0" encoding="utf-8"?>
+<file path=ppt/slides/slide4.xml><?xml version="1.0" encoding="utf-8"?>
 <p:sld xmlns:a="http://schemas.openxmlformats.org/drawingml/2006/main" xmlns:r="http://schemas.openxmlformats.org/officeDocument/2006/relationships" xmlns:p="http://schemas.openxmlformats.org/presentationml/2006/main">
   <p:cSld>
     <p:spTree>
@@ -8212,7 +7716,7 @@
             </a:pPr>
             <a:fld id="{00000000-1234-1234-1234-123412341234}" type="slidenum">
               <a:rPr lang="pt-BR"/>
-              <a:t>5</a:t>
+              <a:t>4</a:t>
             </a:fld>
             <a:endParaRPr/>
           </a:p>
@@ -8641,6 +8145,191 @@
           <a:ln>
             <a:noFill/>
           </a:ln>
+        </p:spPr>
+      </p:pic>
+    </p:spTree>
+  </p:cSld>
+  <p:clrMapOvr>
+    <a:masterClrMapping/>
+  </p:clrMapOvr>
+</p:sld>
+</file>
+
+<file path=ppt/slides/slide5.xml><?xml version="1.0" encoding="utf-8"?>
+<p:sld xmlns:a="http://schemas.openxmlformats.org/drawingml/2006/main" xmlns:r="http://schemas.openxmlformats.org/officeDocument/2006/relationships" xmlns:p="http://schemas.openxmlformats.org/presentationml/2006/main">
+  <p:cSld>
+    <p:spTree>
+      <p:nvGrpSpPr>
+        <p:cNvPr id="1" name="Shape 726"/>
+        <p:cNvGrpSpPr/>
+        <p:nvPr/>
+      </p:nvGrpSpPr>
+      <p:grpSpPr>
+        <a:xfrm>
+          <a:off x="0" y="0"/>
+          <a:ext cx="0" cy="0"/>
+          <a:chOff x="0" y="0"/>
+          <a:chExt cx="0" cy="0"/>
+        </a:xfrm>
+      </p:grpSpPr>
+      <p:sp>
+        <p:nvSpPr>
+          <p:cNvPr id="727" name="Google Shape;727;p61"/>
+          <p:cNvSpPr txBox="1">
+            <a:spLocks noGrp="1"/>
+          </p:cNvSpPr>
+          <p:nvPr>
+            <p:ph type="title"/>
+          </p:nvPr>
+        </p:nvSpPr>
+        <p:spPr>
+          <a:xfrm>
+            <a:off x="84172" y="113717"/>
+            <a:ext cx="8428200" cy="516000"/>
+          </a:xfrm>
+          <a:prstGeom prst="rect">
+            <a:avLst/>
+          </a:prstGeom>
+        </p:spPr>
+        <p:txBody>
+          <a:bodyPr spcFirstLastPara="1" wrap="square" lIns="91425" tIns="45700" rIns="91425" bIns="45700" anchor="t" anchorCtr="0">
+            <a:noAutofit/>
+          </a:bodyPr>
+          <a:lstStyle/>
+          <a:p>
+            <a:pPr marL="0" lvl="0" indent="0" algn="l" rtl="0">
+              <a:spcBef>
+                <a:spcPts val="0"/>
+              </a:spcBef>
+              <a:spcAft>
+                <a:spcPts val="0"/>
+              </a:spcAft>
+              <a:buNone/>
+            </a:pPr>
+            <a:r>
+              <a:rPr lang="pt-BR"/>
+              <a:t>Geração de Esferas em 3D</a:t>
+            </a:r>
+            <a:endParaRPr/>
+          </a:p>
+        </p:txBody>
+      </p:sp>
+      <p:sp>
+        <p:nvSpPr>
+          <p:cNvPr id="728" name="Google Shape;728;p61"/>
+          <p:cNvSpPr txBox="1">
+            <a:spLocks noGrp="1"/>
+          </p:cNvSpPr>
+          <p:nvPr>
+            <p:ph type="body" idx="1"/>
+          </p:nvPr>
+        </p:nvSpPr>
+        <p:spPr>
+          <a:xfrm>
+            <a:off x="390550" y="838982"/>
+            <a:ext cx="8428200" cy="1127100"/>
+          </a:xfrm>
+          <a:prstGeom prst="rect">
+            <a:avLst/>
+          </a:prstGeom>
+        </p:spPr>
+        <p:txBody>
+          <a:bodyPr spcFirstLastPara="1" wrap="square" lIns="91425" tIns="45700" rIns="91425" bIns="45700" anchor="t" anchorCtr="0">
+            <a:normAutofit/>
+          </a:bodyPr>
+          <a:lstStyle/>
+          <a:p>
+            <a:pPr marL="0" lvl="0" indent="0" algn="l" rtl="0">
+              <a:spcBef>
+                <a:spcPts val="400"/>
+              </a:spcBef>
+              <a:spcAft>
+                <a:spcPts val="0"/>
+              </a:spcAft>
+              <a:buNone/>
+            </a:pPr>
+            <a:r>
+              <a:rPr lang="pt-BR"/>
+              <a:t>Você é capaz de gerar um esfera 3D composta por vértices e arestas? Qual seria a sua técnica?</a:t>
+            </a:r>
+            <a:endParaRPr/>
+          </a:p>
+        </p:txBody>
+      </p:sp>
+      <p:sp>
+        <p:nvSpPr>
+          <p:cNvPr id="729" name="Google Shape;729;p61"/>
+          <p:cNvSpPr txBox="1">
+            <a:spLocks noGrp="1"/>
+          </p:cNvSpPr>
+          <p:nvPr>
+            <p:ph type="sldNum" idx="12"/>
+          </p:nvPr>
+        </p:nvSpPr>
+        <p:spPr>
+          <a:xfrm>
+            <a:off x="0" y="5410729"/>
+            <a:ext cx="474900" cy="304200"/>
+          </a:xfrm>
+          <a:prstGeom prst="rect">
+            <a:avLst/>
+          </a:prstGeom>
+        </p:spPr>
+        <p:txBody>
+          <a:bodyPr spcFirstLastPara="1" wrap="square" lIns="91425" tIns="45700" rIns="91425" bIns="45700" anchor="ctr" anchorCtr="0">
+            <a:noAutofit/>
+          </a:bodyPr>
+          <a:lstStyle/>
+          <a:p>
+            <a:pPr marL="0" lvl="0" indent="0" algn="ctr" rtl="0">
+              <a:spcBef>
+                <a:spcPts val="0"/>
+              </a:spcBef>
+              <a:spcAft>
+                <a:spcPts val="0"/>
+              </a:spcAft>
+              <a:buClr>
+                <a:srgbClr val="000000"/>
+              </a:buClr>
+              <a:buFont typeface="Arial"/>
+              <a:buNone/>
+            </a:pPr>
+            <a:fld id="{00000000-1234-1234-1234-123412341234}" type="slidenum">
+              <a:rPr lang="pt-BR"/>
+              <a:t>5</a:t>
+            </a:fld>
+            <a:endParaRPr/>
+          </a:p>
+        </p:txBody>
+      </p:sp>
+      <p:pic>
+        <p:nvPicPr>
+          <p:cNvPr id="4" name="Picture 3" descr="A picture containing light&#10;&#10;Description automatically generated">
+            <a:extLst>
+              <a:ext uri="{FF2B5EF4-FFF2-40B4-BE49-F238E27FC236}">
+                <a16:creationId xmlns:a16="http://schemas.microsoft.com/office/drawing/2014/main" id="{BC2EFF55-8685-451C-AD1F-92AC0EC95AFB}"/>
+              </a:ext>
+            </a:extLst>
+          </p:cNvPr>
+          <p:cNvPicPr>
+            <a:picLocks noChangeAspect="1"/>
+          </p:cNvPicPr>
+          <p:nvPr/>
+        </p:nvPicPr>
+        <p:blipFill>
+          <a:blip r:embed="rId3"/>
+          <a:stretch>
+            <a:fillRect/>
+          </a:stretch>
+        </p:blipFill>
+        <p:spPr>
+          <a:xfrm>
+            <a:off x="2485553" y="1543106"/>
+            <a:ext cx="3988173" cy="3988173"/>
+          </a:xfrm>
+          <a:prstGeom prst="rect">
+            <a:avLst/>
+          </a:prstGeom>
         </p:spPr>
       </p:pic>
     </p:spTree>
@@ -8827,6 +8516,11 @@
         </p:spPr>
       </p:pic>
     </p:spTree>
+    <p:extLst>
+      <p:ext uri="{BB962C8B-B14F-4D97-AF65-F5344CB8AC3E}">
+        <p14:creationId xmlns:p14="http://schemas.microsoft.com/office/powerpoint/2010/main" val="385718433"/>
+      </p:ext>
+    </p:extLst>
   </p:cSld>
   <p:clrMapOvr>
     <a:masterClrMapping/>

</xml_diff>